<commit_message>
TDD Training Review + images
</commit_message>
<xml_diff>
--- a/MDS_Material/TDD/TDD Apresentação.pptx
+++ b/MDS_Material/TDD/TDD Apresentação.pptx
@@ -494,7 +494,7 @@
   <p:cSld>
     <p:spTree>
       <p:nvGrpSpPr>
-        <p:cNvPr id="330" name="Shape 330"/>
+        <p:cNvPr id="331" name="Shape 331"/>
         <p:cNvGrpSpPr/>
         <p:nvPr/>
       </p:nvGrpSpPr>
@@ -508,7 +508,7 @@
       </p:grpSpPr>
       <p:sp>
         <p:nvSpPr>
-          <p:cNvPr id="331" name="Shape 331"/>
+          <p:cNvPr id="332" name="Shape 332"/>
           <p:cNvSpPr/>
           <p:nvPr>
             <p:ph idx="2" type="sldImg"/>
@@ -542,7 +542,7 @@
       </p:sp>
       <p:sp>
         <p:nvSpPr>
-          <p:cNvPr id="332" name="Shape 332"/>
+          <p:cNvPr id="333" name="Shape 333"/>
           <p:cNvSpPr txBox="1"/>
           <p:nvPr>
             <p:ph idx="1" type="body"/>
@@ -589,7 +589,7 @@
   <p:cSld>
     <p:spTree>
       <p:nvGrpSpPr>
-        <p:cNvPr id="337" name="Shape 337"/>
+        <p:cNvPr id="338" name="Shape 338"/>
         <p:cNvGrpSpPr/>
         <p:nvPr/>
       </p:nvGrpSpPr>
@@ -603,7 +603,7 @@
       </p:grpSpPr>
       <p:sp>
         <p:nvSpPr>
-          <p:cNvPr id="338" name="Shape 338"/>
+          <p:cNvPr id="339" name="Shape 339"/>
           <p:cNvSpPr/>
           <p:nvPr>
             <p:ph idx="2" type="sldImg"/>
@@ -637,7 +637,7 @@
       </p:sp>
       <p:sp>
         <p:nvSpPr>
-          <p:cNvPr id="339" name="Shape 339"/>
+          <p:cNvPr id="340" name="Shape 340"/>
           <p:cNvSpPr txBox="1"/>
           <p:nvPr>
             <p:ph idx="1" type="body"/>
@@ -684,7 +684,7 @@
   <p:cSld>
     <p:spTree>
       <p:nvGrpSpPr>
-        <p:cNvPr id="342" name="Shape 342"/>
+        <p:cNvPr id="344" name="Shape 344"/>
         <p:cNvGrpSpPr/>
         <p:nvPr/>
       </p:nvGrpSpPr>
@@ -698,7 +698,7 @@
       </p:grpSpPr>
       <p:sp>
         <p:nvSpPr>
-          <p:cNvPr id="343" name="Shape 343"/>
+          <p:cNvPr id="345" name="Shape 345"/>
           <p:cNvSpPr/>
           <p:nvPr>
             <p:ph idx="2" type="sldImg"/>
@@ -732,7 +732,7 @@
       </p:sp>
       <p:sp>
         <p:nvSpPr>
-          <p:cNvPr id="344" name="Shape 344"/>
+          <p:cNvPr id="346" name="Shape 346"/>
           <p:cNvSpPr txBox="1"/>
           <p:nvPr>
             <p:ph idx="1" type="body"/>
@@ -779,7 +779,7 @@
   <p:cSld>
     <p:spTree>
       <p:nvGrpSpPr>
-        <p:cNvPr id="348" name="Shape 348"/>
+        <p:cNvPr id="350" name="Shape 350"/>
         <p:cNvGrpSpPr/>
         <p:nvPr/>
       </p:nvGrpSpPr>
@@ -793,7 +793,7 @@
       </p:grpSpPr>
       <p:sp>
         <p:nvSpPr>
-          <p:cNvPr id="349" name="Shape 349"/>
+          <p:cNvPr id="351" name="Shape 351"/>
           <p:cNvSpPr/>
           <p:nvPr>
             <p:ph idx="2" type="sldImg"/>
@@ -827,7 +827,7 @@
       </p:sp>
       <p:sp>
         <p:nvSpPr>
-          <p:cNvPr id="350" name="Shape 350"/>
+          <p:cNvPr id="352" name="Shape 352"/>
           <p:cNvSpPr txBox="1"/>
           <p:nvPr>
             <p:ph idx="1" type="body"/>
@@ -874,7 +874,7 @@
   <p:cSld>
     <p:spTree>
       <p:nvGrpSpPr>
-        <p:cNvPr id="354" name="Shape 354"/>
+        <p:cNvPr id="356" name="Shape 356"/>
         <p:cNvGrpSpPr/>
         <p:nvPr/>
       </p:nvGrpSpPr>
@@ -888,7 +888,7 @@
       </p:grpSpPr>
       <p:sp>
         <p:nvSpPr>
-          <p:cNvPr id="355" name="Shape 355"/>
+          <p:cNvPr id="357" name="Shape 357"/>
           <p:cNvSpPr/>
           <p:nvPr>
             <p:ph idx="2" type="sldImg"/>
@@ -922,7 +922,7 @@
       </p:sp>
       <p:sp>
         <p:nvSpPr>
-          <p:cNvPr id="356" name="Shape 356"/>
+          <p:cNvPr id="358" name="Shape 358"/>
           <p:cNvSpPr txBox="1"/>
           <p:nvPr>
             <p:ph idx="1" type="body"/>
@@ -969,7 +969,7 @@
   <p:cSld>
     <p:spTree>
       <p:nvGrpSpPr>
-        <p:cNvPr id="372" name="Shape 372"/>
+        <p:cNvPr id="374" name="Shape 374"/>
         <p:cNvGrpSpPr/>
         <p:nvPr/>
       </p:nvGrpSpPr>
@@ -983,7 +983,7 @@
       </p:grpSpPr>
       <p:sp>
         <p:nvSpPr>
-          <p:cNvPr id="373" name="Shape 373"/>
+          <p:cNvPr id="375" name="Shape 375"/>
           <p:cNvSpPr/>
           <p:nvPr>
             <p:ph idx="2" type="sldImg"/>
@@ -1017,7 +1017,7 @@
       </p:sp>
       <p:sp>
         <p:nvSpPr>
-          <p:cNvPr id="374" name="Shape 374"/>
+          <p:cNvPr id="376" name="Shape 376"/>
           <p:cNvSpPr txBox="1"/>
           <p:nvPr>
             <p:ph idx="1" type="body"/>
@@ -1064,7 +1064,7 @@
   <p:cSld>
     <p:spTree>
       <p:nvGrpSpPr>
-        <p:cNvPr id="379" name="Shape 379"/>
+        <p:cNvPr id="381" name="Shape 381"/>
         <p:cNvGrpSpPr/>
         <p:nvPr/>
       </p:nvGrpSpPr>
@@ -1078,7 +1078,7 @@
       </p:grpSpPr>
       <p:sp>
         <p:nvSpPr>
-          <p:cNvPr id="380" name="Shape 380"/>
+          <p:cNvPr id="382" name="Shape 382"/>
           <p:cNvSpPr/>
           <p:nvPr>
             <p:ph idx="2" type="sldImg"/>
@@ -1112,7 +1112,7 @@
       </p:sp>
       <p:sp>
         <p:nvSpPr>
-          <p:cNvPr id="381" name="Shape 381"/>
+          <p:cNvPr id="383" name="Shape 383"/>
           <p:cNvSpPr txBox="1"/>
           <p:nvPr>
             <p:ph idx="1" type="body"/>
@@ -1159,7 +1159,7 @@
   <p:cSld>
     <p:spTree>
       <p:nvGrpSpPr>
-        <p:cNvPr id="388" name="Shape 388"/>
+        <p:cNvPr id="390" name="Shape 390"/>
         <p:cNvGrpSpPr/>
         <p:nvPr/>
       </p:nvGrpSpPr>
@@ -1173,7 +1173,7 @@
       </p:grpSpPr>
       <p:sp>
         <p:nvSpPr>
-          <p:cNvPr id="389" name="Shape 389"/>
+          <p:cNvPr id="391" name="Shape 391"/>
           <p:cNvSpPr/>
           <p:nvPr>
             <p:ph idx="2" type="sldImg"/>
@@ -1207,7 +1207,7 @@
       </p:sp>
       <p:sp>
         <p:nvSpPr>
-          <p:cNvPr id="390" name="Shape 390"/>
+          <p:cNvPr id="392" name="Shape 392"/>
           <p:cNvSpPr txBox="1"/>
           <p:nvPr>
             <p:ph idx="1" type="body"/>
@@ -47293,6 +47293,48 @@
           </a:p>
         </p:txBody>
       </p:sp>
+      <p:sp>
+        <p:nvSpPr>
+          <p:cNvPr id="330" name="Shape 330"/>
+          <p:cNvSpPr txBox="1"/>
+          <p:nvPr/>
+        </p:nvSpPr>
+        <p:spPr>
+          <a:xfrm>
+            <a:off x="90025" y="3477775"/>
+            <a:ext cx="2982600" cy="756300"/>
+          </a:xfrm>
+          <a:prstGeom prst="rect">
+            <a:avLst/>
+          </a:prstGeom>
+          <a:noFill/>
+          <a:ln>
+            <a:noFill/>
+          </a:ln>
+        </p:spPr>
+        <p:txBody>
+          <a:bodyPr anchorCtr="0" anchor="t" bIns="91425" lIns="91425" rIns="91425" tIns="91425">
+            <a:noAutofit/>
+          </a:bodyPr>
+          <a:lstStyle/>
+          <a:p>
+            <a:pPr lvl="0">
+              <a:spcBef>
+                <a:spcPts val="0"/>
+              </a:spcBef>
+              <a:buNone/>
+            </a:pPr>
+            <a:r>
+              <a:t/>
+            </a:r>
+            <a:endParaRPr>
+              <a:solidFill>
+                <a:srgbClr val="F3F3F3"/>
+              </a:solidFill>
+            </a:endParaRPr>
+          </a:p>
+        </p:txBody>
+      </p:sp>
     </p:spTree>
   </p:cSld>
   <p:clrMapOvr>
@@ -47306,7 +47348,7 @@
   <p:cSld>
     <p:spTree>
       <p:nvGrpSpPr>
-        <p:cNvPr id="333" name="Shape 333"/>
+        <p:cNvPr id="334" name="Shape 334"/>
         <p:cNvGrpSpPr/>
         <p:nvPr/>
       </p:nvGrpSpPr>
@@ -47320,7 +47362,7 @@
       </p:grpSpPr>
       <p:sp>
         <p:nvSpPr>
-          <p:cNvPr id="334" name="Shape 334"/>
+          <p:cNvPr id="335" name="Shape 335"/>
           <p:cNvSpPr txBox="1"/>
           <p:nvPr>
             <p:ph type="ctrTitle"/>
@@ -47356,7 +47398,7 @@
       </p:sp>
       <p:sp>
         <p:nvSpPr>
-          <p:cNvPr id="335" name="Shape 335"/>
+          <p:cNvPr id="336" name="Shape 336"/>
           <p:cNvSpPr txBox="1"/>
           <p:nvPr>
             <p:ph idx="1" type="subTitle"/>
@@ -47392,7 +47434,7 @@
       </p:sp>
       <p:sp>
         <p:nvSpPr>
-          <p:cNvPr id="336" name="Shape 336"/>
+          <p:cNvPr id="337" name="Shape 337"/>
           <p:cNvSpPr txBox="1"/>
           <p:nvPr/>
         </p:nvSpPr>
@@ -47449,7 +47491,7 @@
   <p:cSld>
     <p:spTree>
       <p:nvGrpSpPr>
-        <p:cNvPr id="340" name="Shape 340"/>
+        <p:cNvPr id="341" name="Shape 341"/>
         <p:cNvGrpSpPr/>
         <p:nvPr/>
       </p:nvGrpSpPr>
@@ -47463,7 +47505,7 @@
       </p:grpSpPr>
       <p:sp>
         <p:nvSpPr>
-          <p:cNvPr id="341" name="Shape 341"/>
+          <p:cNvPr id="342" name="Shape 342"/>
           <p:cNvSpPr txBox="1"/>
           <p:nvPr>
             <p:ph idx="1" type="body"/>
@@ -47471,8 +47513,8 @@
         </p:nvSpPr>
         <p:spPr>
           <a:xfrm>
-            <a:off x="2051200" y="2085600"/>
-            <a:ext cx="6282299" cy="819899"/>
+            <a:off x="2011700" y="3045150"/>
+            <a:ext cx="6282300" cy="819900"/>
           </a:xfrm>
           <a:prstGeom prst="rect">
             <a:avLst/>
@@ -47497,6 +47539,52 @@
           </a:p>
         </p:txBody>
       </p:sp>
+      <p:sp>
+        <p:nvSpPr>
+          <p:cNvPr id="343" name="Shape 343"/>
+          <p:cNvSpPr txBox="1"/>
+          <p:nvPr/>
+        </p:nvSpPr>
+        <p:spPr>
+          <a:xfrm>
+            <a:off x="1955250" y="632225"/>
+            <a:ext cx="6639300" cy="2253600"/>
+          </a:xfrm>
+          <a:prstGeom prst="rect">
+            <a:avLst/>
+          </a:prstGeom>
+          <a:noFill/>
+          <a:ln>
+            <a:noFill/>
+          </a:ln>
+        </p:spPr>
+        <p:txBody>
+          <a:bodyPr anchorCtr="0" anchor="ctr" bIns="91425" lIns="91425" rIns="91425" tIns="91425">
+            <a:noAutofit/>
+          </a:bodyPr>
+          <a:lstStyle/>
+          <a:p>
+            <a:pPr lvl="0" rtl="0">
+              <a:spcBef>
+                <a:spcPts val="0"/>
+              </a:spcBef>
+              <a:buNone/>
+            </a:pPr>
+            <a:r>
+              <a:rPr lang="en" sz="4000">
+                <a:solidFill>
+                  <a:srgbClr val="19BBD5"/>
+                </a:solidFill>
+                <a:latin typeface="Nixie One"/>
+                <a:ea typeface="Nixie One"/>
+                <a:cs typeface="Nixie One"/>
+                <a:sym typeface="Nixie One"/>
+              </a:rPr>
+              <a:t>Desenvolvimento orientado a testes?</a:t>
+            </a:r>
+          </a:p>
+        </p:txBody>
+      </p:sp>
     </p:spTree>
   </p:cSld>
   <p:clrMapOvr>
@@ -47510,7 +47598,7 @@
   <p:cSld>
     <p:spTree>
       <p:nvGrpSpPr>
-        <p:cNvPr id="345" name="Shape 345"/>
+        <p:cNvPr id="347" name="Shape 347"/>
         <p:cNvGrpSpPr/>
         <p:nvPr/>
       </p:nvGrpSpPr>
@@ -47524,7 +47612,7 @@
       </p:grpSpPr>
       <p:sp>
         <p:nvSpPr>
-          <p:cNvPr id="346" name="Shape 346"/>
+          <p:cNvPr id="348" name="Shape 348"/>
           <p:cNvSpPr txBox="1"/>
           <p:nvPr>
             <p:ph type="title"/>
@@ -47560,7 +47648,7 @@
       </p:sp>
       <p:sp>
         <p:nvSpPr>
-          <p:cNvPr id="347" name="Shape 347"/>
+          <p:cNvPr id="349" name="Shape 349"/>
           <p:cNvSpPr txBox="1"/>
           <p:nvPr>
             <p:ph idx="1" type="body"/>
@@ -47568,8 +47656,8 @@
         </p:nvSpPr>
         <p:spPr>
           <a:xfrm>
-            <a:off x="1732700" y="2255124"/>
-            <a:ext cx="4944300" cy="1659900"/>
+            <a:off x="1732700" y="2255125"/>
+            <a:ext cx="4944300" cy="2239200"/>
           </a:xfrm>
           <a:prstGeom prst="rect">
             <a:avLst/>
@@ -47581,36 +47669,25 @@
           </a:bodyPr>
           <a:lstStyle/>
           <a:p>
-            <a:pPr indent="-228600" lvl="0" marL="457200">
+            <a:pPr indent="-228600" lvl="0" marL="457200" rtl="0">
               <a:spcBef>
                 <a:spcPts val="0"/>
               </a:spcBef>
             </a:pPr>
             <a:r>
               <a:rPr lang="en"/>
-              <a:t>Qualidade do Código</a:t>
+              <a:t>Sem influências de código pronto</a:t>
             </a:r>
           </a:p>
           <a:p>
-            <a:pPr indent="-228600" lvl="0" marL="457200">
+            <a:pPr indent="-228600" lvl="1" marL="914400" rtl="0">
               <a:spcBef>
-                <a:spcPts val="0"/>
+                <a:spcPts val="600"/>
               </a:spcBef>
             </a:pPr>
             <a:r>
               <a:rPr lang="en"/>
-              <a:t>Raciocínio</a:t>
-            </a:r>
-          </a:p>
-          <a:p>
-            <a:pPr indent="-228600" lvl="0" marL="457200">
-              <a:spcBef>
-                <a:spcPts val="0"/>
-              </a:spcBef>
-            </a:pPr>
-            <a:r>
-              <a:rPr lang="en"/>
-              <a:t>Segurança </a:t>
+              <a:t>Qualidade do Código</a:t>
             </a:r>
           </a:p>
           <a:p>
@@ -47621,7 +47698,62 @@
             </a:pPr>
             <a:r>
               <a:rPr lang="en"/>
-              <a:t>Documentação.</a:t>
+              <a:t>Raciocínio diferente</a:t>
+            </a:r>
+          </a:p>
+          <a:p>
+            <a:pPr indent="-228600" lvl="1" marL="914400">
+              <a:spcBef>
+                <a:spcPts val="0"/>
+              </a:spcBef>
+            </a:pPr>
+            <a:r>
+              <a:rPr lang="en"/>
+              <a:t>Outra visão do problema</a:t>
+            </a:r>
+          </a:p>
+          <a:p>
+            <a:pPr indent="-228600" lvl="0" marL="457200" rtl="0">
+              <a:spcBef>
+                <a:spcPts val="0"/>
+              </a:spcBef>
+            </a:pPr>
+            <a:r>
+              <a:rPr lang="en"/>
+              <a:t>Segurança</a:t>
+            </a:r>
+          </a:p>
+          <a:p>
+            <a:pPr indent="-228600" lvl="1" marL="914400">
+              <a:spcBef>
+                <a:spcPts val="0"/>
+              </a:spcBef>
+            </a:pPr>
+            <a:r>
+              <a:rPr lang="en"/>
+              <a:t>Alterações, por mínimas que sejam, devem ser cuidadosas</a:t>
+            </a:r>
+          </a:p>
+          <a:p>
+            <a:pPr indent="-228600" lvl="0" marL="457200" rtl="0">
+              <a:spcBef>
+                <a:spcPts val="0"/>
+              </a:spcBef>
+            </a:pPr>
+            <a:r>
+              <a:rPr lang="en"/>
+              <a:t>Documentação</a:t>
+            </a:r>
+          </a:p>
+          <a:p>
+            <a:pPr indent="-228600" lvl="1" marL="914400" rtl="0">
+              <a:spcBef>
+                <a:spcPts val="0"/>
+              </a:spcBef>
+            </a:pPr>
+            <a:r>
+              <a:rPr lang="en"/>
+              <a:t>Fácil e enxuta</a:t>
             </a:r>
           </a:p>
           <a:p>
@@ -47651,7 +47783,7 @@
   <p:cSld>
     <p:spTree>
       <p:nvGrpSpPr>
-        <p:cNvPr id="351" name="Shape 351"/>
+        <p:cNvPr id="353" name="Shape 353"/>
         <p:cNvGrpSpPr/>
         <p:nvPr/>
       </p:nvGrpSpPr>
@@ -47665,7 +47797,7 @@
       </p:grpSpPr>
       <p:sp>
         <p:nvSpPr>
-          <p:cNvPr id="352" name="Shape 352"/>
+          <p:cNvPr id="354" name="Shape 354"/>
           <p:cNvSpPr txBox="1"/>
           <p:nvPr>
             <p:ph type="title"/>
@@ -47701,7 +47833,7 @@
       </p:sp>
       <p:sp>
         <p:nvSpPr>
-          <p:cNvPr id="353" name="Shape 353"/>
+          <p:cNvPr id="355" name="Shape 355"/>
           <p:cNvSpPr txBox="1"/>
           <p:nvPr>
             <p:ph idx="1" type="body"/>
@@ -47744,6 +47876,17 @@
             </a:r>
           </a:p>
           <a:p>
+            <a:pPr indent="-228600" lvl="1" marL="914400" rtl="0">
+              <a:spcBef>
+                <a:spcPts val="0"/>
+              </a:spcBef>
+            </a:pPr>
+            <a:r>
+              <a:rPr lang="en"/>
+              <a:t>Lógica contrária a “programação natural”</a:t>
+            </a:r>
+          </a:p>
+          <a:p>
             <a:pPr indent="-228600" lvl="0" marL="457200" rtl="0">
               <a:spcBef>
                 <a:spcPts val="0"/>
@@ -47755,7 +47898,7 @@
             </a:r>
           </a:p>
           <a:p>
-            <a:pPr indent="-228600" lvl="0" marL="457200">
+            <a:pPr indent="-228600" lvl="0" marL="457200" rtl="0">
               <a:spcBef>
                 <a:spcPts val="0"/>
               </a:spcBef>
@@ -47770,7 +47913,18 @@
             </a:r>
             <a:r>
               <a:rPr lang="en"/>
-              <a:t> 100%.</a:t>
+              <a:t> popular.</a:t>
+            </a:r>
+          </a:p>
+          <a:p>
+            <a:pPr indent="-228600" lvl="1" marL="914400">
+              <a:spcBef>
+                <a:spcPts val="0"/>
+              </a:spcBef>
+            </a:pPr>
+            <a:r>
+              <a:rPr lang="en"/>
+              <a:t>Muitos programadores preferem ir pelo modo “tradicional”</a:t>
             </a:r>
           </a:p>
         </p:txBody>
@@ -47788,7 +47942,7 @@
   <p:cSld>
     <p:spTree>
       <p:nvGrpSpPr>
-        <p:cNvPr id="357" name="Shape 357"/>
+        <p:cNvPr id="359" name="Shape 359"/>
         <p:cNvGrpSpPr/>
         <p:nvPr/>
       </p:nvGrpSpPr>
@@ -47802,7 +47956,7 @@
       </p:grpSpPr>
       <p:sp>
         <p:nvSpPr>
-          <p:cNvPr id="358" name="Shape 358"/>
+          <p:cNvPr id="360" name="Shape 360"/>
           <p:cNvSpPr/>
           <p:nvPr/>
         </p:nvSpPr>
@@ -47893,7 +48047,7 @@
       </p:sp>
       <p:sp>
         <p:nvSpPr>
-          <p:cNvPr id="359" name="Shape 359"/>
+          <p:cNvPr id="361" name="Shape 361"/>
           <p:cNvSpPr txBox="1"/>
           <p:nvPr>
             <p:ph idx="4294967295" type="ctrTitle"/>
@@ -47929,7 +48083,7 @@
       </p:sp>
       <p:sp>
         <p:nvSpPr>
-          <p:cNvPr id="360" name="Shape 360"/>
+          <p:cNvPr id="362" name="Shape 362"/>
           <p:cNvSpPr txBox="1"/>
           <p:nvPr>
             <p:ph idx="4294967295" type="subTitle"/>
@@ -47965,7 +48119,7 @@
       </p:sp>
       <p:grpSp>
         <p:nvGrpSpPr>
-          <p:cNvPr id="361" name="Shape 361"/>
+          <p:cNvPr id="363" name="Shape 363"/>
           <p:cNvGrpSpPr/>
           <p:nvPr/>
         </p:nvGrpSpPr>
@@ -47979,7 +48133,7 @@
         </p:grpSpPr>
         <p:sp>
           <p:nvSpPr>
-            <p:cNvPr id="362" name="Shape 362"/>
+            <p:cNvPr id="364" name="Shape 364"/>
             <p:cNvSpPr/>
             <p:nvPr/>
           </p:nvSpPr>
@@ -48146,7 +48300,7 @@
         </p:sp>
         <p:sp>
           <p:nvSpPr>
-            <p:cNvPr id="363" name="Shape 363"/>
+            <p:cNvPr id="365" name="Shape 365"/>
             <p:cNvSpPr/>
             <p:nvPr/>
           </p:nvSpPr>
@@ -48877,7 +49031,7 @@
       </p:grpSp>
       <p:grpSp>
         <p:nvGrpSpPr>
-          <p:cNvPr id="364" name="Shape 364"/>
+          <p:cNvPr id="366" name="Shape 366"/>
           <p:cNvGrpSpPr/>
           <p:nvPr/>
         </p:nvGrpSpPr>
@@ -48891,7 +49045,7 @@
         </p:grpSpPr>
         <p:sp>
           <p:nvSpPr>
-            <p:cNvPr id="365" name="Shape 365"/>
+            <p:cNvPr id="367" name="Shape 367"/>
             <p:cNvSpPr/>
             <p:nvPr/>
           </p:nvSpPr>
@@ -49399,268 +49553,6 @@
                   </a:lnTo>
                   <a:lnTo>
                     <a:pt x="15314" y="1"/>
-                  </a:lnTo>
-                  <a:close/>
-                </a:path>
-              </a:pathLst>
-            </a:custGeom>
-            <a:solidFill>
-              <a:srgbClr val="0E293C"/>
-            </a:solidFill>
-            <a:ln>
-              <a:noFill/>
-            </a:ln>
-          </p:spPr>
-          <p:txBody>
-            <a:bodyPr anchorCtr="0" anchor="ctr" bIns="91425" lIns="91425" rIns="91425" tIns="91425">
-              <a:noAutofit/>
-            </a:bodyPr>
-            <a:lstStyle/>
-            <a:p>
-              <a:pPr lvl="0">
-                <a:spcBef>
-                  <a:spcPts val="0"/>
-                </a:spcBef>
-                <a:buNone/>
-              </a:pPr>
-              <a:r>
-                <a:t/>
-              </a:r>
-              <a:endParaRPr/>
-            </a:p>
-          </p:txBody>
-        </p:sp>
-        <p:sp>
-          <p:nvSpPr>
-            <p:cNvPr id="366" name="Shape 366"/>
-            <p:cNvSpPr/>
-            <p:nvPr/>
-          </p:nvSpPr>
-          <p:spPr>
-            <a:xfrm>
-              <a:off x="597725" y="4665400"/>
-              <a:ext cx="73300" cy="73300"/>
-            </a:xfrm>
-            <a:custGeom>
-              <a:pathLst>
-                <a:path extrusionOk="0" h="2932" w="2932">
-                  <a:moveTo>
-                    <a:pt x="2028" y="1"/>
-                  </a:moveTo>
-                  <a:lnTo>
-                    <a:pt x="1857" y="25"/>
-                  </a:lnTo>
-                  <a:lnTo>
-                    <a:pt x="1686" y="74"/>
-                  </a:lnTo>
-                  <a:lnTo>
-                    <a:pt x="1515" y="147"/>
-                  </a:lnTo>
-                  <a:lnTo>
-                    <a:pt x="1369" y="269"/>
-                  </a:lnTo>
-                  <a:lnTo>
-                    <a:pt x="1222" y="489"/>
-                  </a:lnTo>
-                  <a:lnTo>
-                    <a:pt x="1002" y="831"/>
-                  </a:lnTo>
-                  <a:lnTo>
-                    <a:pt x="563" y="1735"/>
-                  </a:lnTo>
-                  <a:lnTo>
-                    <a:pt x="172" y="2565"/>
-                  </a:lnTo>
-                  <a:lnTo>
-                    <a:pt x="1" y="2932"/>
-                  </a:lnTo>
-                  <a:lnTo>
-                    <a:pt x="1" y="2932"/>
-                  </a:lnTo>
-                  <a:lnTo>
-                    <a:pt x="367" y="2761"/>
-                  </a:lnTo>
-                  <a:lnTo>
-                    <a:pt x="1198" y="2370"/>
-                  </a:lnTo>
-                  <a:lnTo>
-                    <a:pt x="2101" y="1930"/>
-                  </a:lnTo>
-                  <a:lnTo>
-                    <a:pt x="2443" y="1710"/>
-                  </a:lnTo>
-                  <a:lnTo>
-                    <a:pt x="2663" y="1564"/>
-                  </a:lnTo>
-                  <a:lnTo>
-                    <a:pt x="2785" y="1417"/>
-                  </a:lnTo>
-                  <a:lnTo>
-                    <a:pt x="2858" y="1246"/>
-                  </a:lnTo>
-                  <a:lnTo>
-                    <a:pt x="2907" y="1075"/>
-                  </a:lnTo>
-                  <a:lnTo>
-                    <a:pt x="2932" y="904"/>
-                  </a:lnTo>
-                  <a:lnTo>
-                    <a:pt x="2907" y="733"/>
-                  </a:lnTo>
-                  <a:lnTo>
-                    <a:pt x="2858" y="562"/>
-                  </a:lnTo>
-                  <a:lnTo>
-                    <a:pt x="2785" y="416"/>
-                  </a:lnTo>
-                  <a:lnTo>
-                    <a:pt x="2663" y="269"/>
-                  </a:lnTo>
-                  <a:lnTo>
-                    <a:pt x="2517" y="147"/>
-                  </a:lnTo>
-                  <a:lnTo>
-                    <a:pt x="2370" y="74"/>
-                  </a:lnTo>
-                  <a:lnTo>
-                    <a:pt x="2199" y="25"/>
-                  </a:lnTo>
-                  <a:lnTo>
-                    <a:pt x="2028" y="1"/>
-                  </a:lnTo>
-                  <a:close/>
-                </a:path>
-              </a:pathLst>
-            </a:custGeom>
-            <a:solidFill>
-              <a:srgbClr val="0E293C"/>
-            </a:solidFill>
-            <a:ln>
-              <a:noFill/>
-            </a:ln>
-          </p:spPr>
-          <p:txBody>
-            <a:bodyPr anchorCtr="0" anchor="ctr" bIns="91425" lIns="91425" rIns="91425" tIns="91425">
-              <a:noAutofit/>
-            </a:bodyPr>
-            <a:lstStyle/>
-            <a:p>
-              <a:pPr lvl="0">
-                <a:spcBef>
-                  <a:spcPts val="0"/>
-                </a:spcBef>
-                <a:buNone/>
-              </a:pPr>
-              <a:r>
-                <a:t/>
-              </a:r>
-              <a:endParaRPr/>
-            </a:p>
-          </p:txBody>
-        </p:sp>
-        <p:sp>
-          <p:nvSpPr>
-            <p:cNvPr id="367" name="Shape 367"/>
-            <p:cNvSpPr/>
-            <p:nvPr/>
-          </p:nvSpPr>
-          <p:spPr>
-            <a:xfrm>
-              <a:off x="654525" y="4708150"/>
-              <a:ext cx="47025" cy="47025"/>
-            </a:xfrm>
-            <a:custGeom>
-              <a:pathLst>
-                <a:path extrusionOk="0" h="1881" w="1881">
-                  <a:moveTo>
-                    <a:pt x="1124" y="0"/>
-                  </a:moveTo>
-                  <a:lnTo>
-                    <a:pt x="977" y="25"/>
-                  </a:lnTo>
-                  <a:lnTo>
-                    <a:pt x="831" y="74"/>
-                  </a:lnTo>
-                  <a:lnTo>
-                    <a:pt x="709" y="147"/>
-                  </a:lnTo>
-                  <a:lnTo>
-                    <a:pt x="586" y="245"/>
-                  </a:lnTo>
-                  <a:lnTo>
-                    <a:pt x="464" y="391"/>
-                  </a:lnTo>
-                  <a:lnTo>
-                    <a:pt x="367" y="611"/>
-                  </a:lnTo>
-                  <a:lnTo>
-                    <a:pt x="269" y="880"/>
-                  </a:lnTo>
-                  <a:lnTo>
-                    <a:pt x="171" y="1173"/>
-                  </a:lnTo>
-                  <a:lnTo>
-                    <a:pt x="49" y="1686"/>
-                  </a:lnTo>
-                  <a:lnTo>
-                    <a:pt x="0" y="1881"/>
-                  </a:lnTo>
-                  <a:lnTo>
-                    <a:pt x="0" y="1881"/>
-                  </a:lnTo>
-                  <a:lnTo>
-                    <a:pt x="220" y="1857"/>
-                  </a:lnTo>
-                  <a:lnTo>
-                    <a:pt x="733" y="1710"/>
-                  </a:lnTo>
-                  <a:lnTo>
-                    <a:pt x="1002" y="1637"/>
-                  </a:lnTo>
-                  <a:lnTo>
-                    <a:pt x="1270" y="1539"/>
-                  </a:lnTo>
-                  <a:lnTo>
-                    <a:pt x="1515" y="1417"/>
-                  </a:lnTo>
-                  <a:lnTo>
-                    <a:pt x="1661" y="1319"/>
-                  </a:lnTo>
-                  <a:lnTo>
-                    <a:pt x="1759" y="1197"/>
-                  </a:lnTo>
-                  <a:lnTo>
-                    <a:pt x="1832" y="1051"/>
-                  </a:lnTo>
-                  <a:lnTo>
-                    <a:pt x="1881" y="928"/>
-                  </a:lnTo>
-                  <a:lnTo>
-                    <a:pt x="1881" y="782"/>
-                  </a:lnTo>
-                  <a:lnTo>
-                    <a:pt x="1881" y="635"/>
-                  </a:lnTo>
-                  <a:lnTo>
-                    <a:pt x="1832" y="489"/>
-                  </a:lnTo>
-                  <a:lnTo>
-                    <a:pt x="1759" y="367"/>
-                  </a:lnTo>
-                  <a:lnTo>
-                    <a:pt x="1661" y="245"/>
-                  </a:lnTo>
-                  <a:lnTo>
-                    <a:pt x="1539" y="147"/>
-                  </a:lnTo>
-                  <a:lnTo>
-                    <a:pt x="1417" y="74"/>
-                  </a:lnTo>
-                  <a:lnTo>
-                    <a:pt x="1270" y="25"/>
-                  </a:lnTo>
-                  <a:lnTo>
-                    <a:pt x="1124" y="0"/>
                   </a:lnTo>
                   <a:close/>
                 </a:path>
@@ -49700,6 +49592,268 @@
           </p:nvSpPr>
           <p:spPr>
             <a:xfrm>
+              <a:off x="597725" y="4665400"/>
+              <a:ext cx="73300" cy="73300"/>
+            </a:xfrm>
+            <a:custGeom>
+              <a:pathLst>
+                <a:path extrusionOk="0" h="2932" w="2932">
+                  <a:moveTo>
+                    <a:pt x="2028" y="1"/>
+                  </a:moveTo>
+                  <a:lnTo>
+                    <a:pt x="1857" y="25"/>
+                  </a:lnTo>
+                  <a:lnTo>
+                    <a:pt x="1686" y="74"/>
+                  </a:lnTo>
+                  <a:lnTo>
+                    <a:pt x="1515" y="147"/>
+                  </a:lnTo>
+                  <a:lnTo>
+                    <a:pt x="1369" y="269"/>
+                  </a:lnTo>
+                  <a:lnTo>
+                    <a:pt x="1222" y="489"/>
+                  </a:lnTo>
+                  <a:lnTo>
+                    <a:pt x="1002" y="831"/>
+                  </a:lnTo>
+                  <a:lnTo>
+                    <a:pt x="563" y="1735"/>
+                  </a:lnTo>
+                  <a:lnTo>
+                    <a:pt x="172" y="2565"/>
+                  </a:lnTo>
+                  <a:lnTo>
+                    <a:pt x="1" y="2932"/>
+                  </a:lnTo>
+                  <a:lnTo>
+                    <a:pt x="1" y="2932"/>
+                  </a:lnTo>
+                  <a:lnTo>
+                    <a:pt x="367" y="2761"/>
+                  </a:lnTo>
+                  <a:lnTo>
+                    <a:pt x="1198" y="2370"/>
+                  </a:lnTo>
+                  <a:lnTo>
+                    <a:pt x="2101" y="1930"/>
+                  </a:lnTo>
+                  <a:lnTo>
+                    <a:pt x="2443" y="1710"/>
+                  </a:lnTo>
+                  <a:lnTo>
+                    <a:pt x="2663" y="1564"/>
+                  </a:lnTo>
+                  <a:lnTo>
+                    <a:pt x="2785" y="1417"/>
+                  </a:lnTo>
+                  <a:lnTo>
+                    <a:pt x="2858" y="1246"/>
+                  </a:lnTo>
+                  <a:lnTo>
+                    <a:pt x="2907" y="1075"/>
+                  </a:lnTo>
+                  <a:lnTo>
+                    <a:pt x="2932" y="904"/>
+                  </a:lnTo>
+                  <a:lnTo>
+                    <a:pt x="2907" y="733"/>
+                  </a:lnTo>
+                  <a:lnTo>
+                    <a:pt x="2858" y="562"/>
+                  </a:lnTo>
+                  <a:lnTo>
+                    <a:pt x="2785" y="416"/>
+                  </a:lnTo>
+                  <a:lnTo>
+                    <a:pt x="2663" y="269"/>
+                  </a:lnTo>
+                  <a:lnTo>
+                    <a:pt x="2517" y="147"/>
+                  </a:lnTo>
+                  <a:lnTo>
+                    <a:pt x="2370" y="74"/>
+                  </a:lnTo>
+                  <a:lnTo>
+                    <a:pt x="2199" y="25"/>
+                  </a:lnTo>
+                  <a:lnTo>
+                    <a:pt x="2028" y="1"/>
+                  </a:lnTo>
+                  <a:close/>
+                </a:path>
+              </a:pathLst>
+            </a:custGeom>
+            <a:solidFill>
+              <a:srgbClr val="0E293C"/>
+            </a:solidFill>
+            <a:ln>
+              <a:noFill/>
+            </a:ln>
+          </p:spPr>
+          <p:txBody>
+            <a:bodyPr anchorCtr="0" anchor="ctr" bIns="91425" lIns="91425" rIns="91425" tIns="91425">
+              <a:noAutofit/>
+            </a:bodyPr>
+            <a:lstStyle/>
+            <a:p>
+              <a:pPr lvl="0">
+                <a:spcBef>
+                  <a:spcPts val="0"/>
+                </a:spcBef>
+                <a:buNone/>
+              </a:pPr>
+              <a:r>
+                <a:t/>
+              </a:r>
+              <a:endParaRPr/>
+            </a:p>
+          </p:txBody>
+        </p:sp>
+        <p:sp>
+          <p:nvSpPr>
+            <p:cNvPr id="369" name="Shape 369"/>
+            <p:cNvSpPr/>
+            <p:nvPr/>
+          </p:nvSpPr>
+          <p:spPr>
+            <a:xfrm>
+              <a:off x="654525" y="4708150"/>
+              <a:ext cx="47025" cy="47025"/>
+            </a:xfrm>
+            <a:custGeom>
+              <a:pathLst>
+                <a:path extrusionOk="0" h="1881" w="1881">
+                  <a:moveTo>
+                    <a:pt x="1124" y="0"/>
+                  </a:moveTo>
+                  <a:lnTo>
+                    <a:pt x="977" y="25"/>
+                  </a:lnTo>
+                  <a:lnTo>
+                    <a:pt x="831" y="74"/>
+                  </a:lnTo>
+                  <a:lnTo>
+                    <a:pt x="709" y="147"/>
+                  </a:lnTo>
+                  <a:lnTo>
+                    <a:pt x="586" y="245"/>
+                  </a:lnTo>
+                  <a:lnTo>
+                    <a:pt x="464" y="391"/>
+                  </a:lnTo>
+                  <a:lnTo>
+                    <a:pt x="367" y="611"/>
+                  </a:lnTo>
+                  <a:lnTo>
+                    <a:pt x="269" y="880"/>
+                  </a:lnTo>
+                  <a:lnTo>
+                    <a:pt x="171" y="1173"/>
+                  </a:lnTo>
+                  <a:lnTo>
+                    <a:pt x="49" y="1686"/>
+                  </a:lnTo>
+                  <a:lnTo>
+                    <a:pt x="0" y="1881"/>
+                  </a:lnTo>
+                  <a:lnTo>
+                    <a:pt x="0" y="1881"/>
+                  </a:lnTo>
+                  <a:lnTo>
+                    <a:pt x="220" y="1857"/>
+                  </a:lnTo>
+                  <a:lnTo>
+                    <a:pt x="733" y="1710"/>
+                  </a:lnTo>
+                  <a:lnTo>
+                    <a:pt x="1002" y="1637"/>
+                  </a:lnTo>
+                  <a:lnTo>
+                    <a:pt x="1270" y="1539"/>
+                  </a:lnTo>
+                  <a:lnTo>
+                    <a:pt x="1515" y="1417"/>
+                  </a:lnTo>
+                  <a:lnTo>
+                    <a:pt x="1661" y="1319"/>
+                  </a:lnTo>
+                  <a:lnTo>
+                    <a:pt x="1759" y="1197"/>
+                  </a:lnTo>
+                  <a:lnTo>
+                    <a:pt x="1832" y="1051"/>
+                  </a:lnTo>
+                  <a:lnTo>
+                    <a:pt x="1881" y="928"/>
+                  </a:lnTo>
+                  <a:lnTo>
+                    <a:pt x="1881" y="782"/>
+                  </a:lnTo>
+                  <a:lnTo>
+                    <a:pt x="1881" y="635"/>
+                  </a:lnTo>
+                  <a:lnTo>
+                    <a:pt x="1832" y="489"/>
+                  </a:lnTo>
+                  <a:lnTo>
+                    <a:pt x="1759" y="367"/>
+                  </a:lnTo>
+                  <a:lnTo>
+                    <a:pt x="1661" y="245"/>
+                  </a:lnTo>
+                  <a:lnTo>
+                    <a:pt x="1539" y="147"/>
+                  </a:lnTo>
+                  <a:lnTo>
+                    <a:pt x="1417" y="74"/>
+                  </a:lnTo>
+                  <a:lnTo>
+                    <a:pt x="1270" y="25"/>
+                  </a:lnTo>
+                  <a:lnTo>
+                    <a:pt x="1124" y="0"/>
+                  </a:lnTo>
+                  <a:close/>
+                </a:path>
+              </a:pathLst>
+            </a:custGeom>
+            <a:solidFill>
+              <a:srgbClr val="0E293C"/>
+            </a:solidFill>
+            <a:ln>
+              <a:noFill/>
+            </a:ln>
+          </p:spPr>
+          <p:txBody>
+            <a:bodyPr anchorCtr="0" anchor="ctr" bIns="91425" lIns="91425" rIns="91425" tIns="91425">
+              <a:noAutofit/>
+            </a:bodyPr>
+            <a:lstStyle/>
+            <a:p>
+              <a:pPr lvl="0">
+                <a:spcBef>
+                  <a:spcPts val="0"/>
+                </a:spcBef>
+                <a:buNone/>
+              </a:pPr>
+              <a:r>
+                <a:t/>
+              </a:r>
+              <a:endParaRPr/>
+            </a:p>
+          </p:txBody>
+        </p:sp>
+        <p:sp>
+          <p:nvSpPr>
+            <p:cNvPr id="370" name="Shape 370"/>
+            <p:cNvSpPr/>
+            <p:nvPr/>
+          </p:nvSpPr>
+          <p:spPr>
+            <a:xfrm>
               <a:off x="581250" y="4634875"/>
               <a:ext cx="47050" cy="47050"/>
             </a:xfrm>
@@ -49820,7 +49974,7 @@
       </p:grpSp>
       <p:sp>
         <p:nvSpPr>
-          <p:cNvPr id="369" name="Shape 369"/>
+          <p:cNvPr id="371" name="Shape 371"/>
           <p:cNvSpPr/>
           <p:nvPr/>
         </p:nvSpPr>
@@ -50134,7 +50288,7 @@
       </p:sp>
       <p:sp>
         <p:nvSpPr>
-          <p:cNvPr id="370" name="Shape 370"/>
+          <p:cNvPr id="372" name="Shape 372"/>
           <p:cNvSpPr/>
           <p:nvPr/>
         </p:nvSpPr>
@@ -50448,7 +50602,7 @@
       </p:sp>
       <p:sp>
         <p:nvSpPr>
-          <p:cNvPr id="371" name="Shape 371"/>
+          <p:cNvPr id="373" name="Shape 373"/>
           <p:cNvSpPr/>
           <p:nvPr/>
         </p:nvSpPr>
@@ -50773,7 +50927,7 @@
   <p:cSld>
     <p:spTree>
       <p:nvGrpSpPr>
-        <p:cNvPr id="375" name="Shape 375"/>
+        <p:cNvPr id="377" name="Shape 377"/>
         <p:cNvGrpSpPr/>
         <p:nvPr/>
       </p:nvGrpSpPr>
@@ -50787,7 +50941,7 @@
       </p:grpSpPr>
       <p:sp>
         <p:nvSpPr>
-          <p:cNvPr id="376" name="Shape 376"/>
+          <p:cNvPr id="378" name="Shape 378"/>
           <p:cNvSpPr txBox="1"/>
           <p:nvPr>
             <p:ph idx="1" type="body"/>
@@ -50835,7 +50989,7 @@
       </p:sp>
       <p:sp>
         <p:nvSpPr>
-          <p:cNvPr id="377" name="Shape 377"/>
+          <p:cNvPr id="379" name="Shape 379"/>
           <p:cNvSpPr txBox="1"/>
           <p:nvPr>
             <p:ph type="title"/>
@@ -50871,7 +51025,7 @@
       </p:sp>
       <p:sp>
         <p:nvSpPr>
-          <p:cNvPr id="378" name="Shape 378"/>
+          <p:cNvPr id="380" name="Shape 380"/>
           <p:cNvSpPr txBox="1"/>
           <p:nvPr>
             <p:ph idx="2" type="body"/>
@@ -50930,7 +51084,7 @@
   <p:cSld>
     <p:spTree>
       <p:nvGrpSpPr>
-        <p:cNvPr id="382" name="Shape 382"/>
+        <p:cNvPr id="384" name="Shape 384"/>
         <p:cNvGrpSpPr/>
         <p:nvPr/>
       </p:nvGrpSpPr>
@@ -50944,7 +51098,7 @@
       </p:grpSpPr>
       <p:sp>
         <p:nvSpPr>
-          <p:cNvPr id="383" name="Shape 383"/>
+          <p:cNvPr id="385" name="Shape 385"/>
           <p:cNvSpPr txBox="1"/>
           <p:nvPr>
             <p:ph type="title"/>
@@ -50980,7 +51134,7 @@
       </p:sp>
       <p:sp>
         <p:nvSpPr>
-          <p:cNvPr id="384" name="Shape 384"/>
+          <p:cNvPr id="386" name="Shape 386"/>
           <p:cNvSpPr/>
           <p:nvPr/>
         </p:nvSpPr>
@@ -51054,7 +51208,7 @@
       </p:sp>
       <p:sp>
         <p:nvSpPr>
-          <p:cNvPr id="385" name="Shape 385"/>
+          <p:cNvPr id="387" name="Shape 387"/>
           <p:cNvSpPr/>
           <p:nvPr/>
         </p:nvSpPr>
@@ -51108,7 +51262,7 @@
       </p:sp>
       <p:sp>
         <p:nvSpPr>
-          <p:cNvPr id="386" name="Shape 386"/>
+          <p:cNvPr id="388" name="Shape 388"/>
           <p:cNvSpPr/>
           <p:nvPr/>
         </p:nvSpPr>
@@ -51182,7 +51336,7 @@
       </p:sp>
       <p:sp>
         <p:nvSpPr>
-          <p:cNvPr id="387" name="Shape 387"/>
+          <p:cNvPr id="389" name="Shape 389"/>
           <p:cNvSpPr/>
           <p:nvPr/>
         </p:nvSpPr>
@@ -51247,7 +51401,7 @@
   <p:cSld>
     <p:spTree>
       <p:nvGrpSpPr>
-        <p:cNvPr id="391" name="Shape 391"/>
+        <p:cNvPr id="393" name="Shape 393"/>
         <p:cNvGrpSpPr/>
         <p:nvPr/>
       </p:nvGrpSpPr>
@@ -51261,7 +51415,7 @@
       </p:grpSpPr>
       <p:sp>
         <p:nvSpPr>
-          <p:cNvPr id="392" name="Shape 392"/>
+          <p:cNvPr id="394" name="Shape 394"/>
           <p:cNvSpPr/>
           <p:nvPr/>
         </p:nvSpPr>
@@ -51352,7 +51506,7 @@
       </p:sp>
       <p:sp>
         <p:nvSpPr>
-          <p:cNvPr id="393" name="Shape 393"/>
+          <p:cNvPr id="395" name="Shape 395"/>
           <p:cNvSpPr txBox="1"/>
           <p:nvPr>
             <p:ph idx="4294967295" type="ctrTitle"/>
@@ -51392,7 +51546,7 @@
       </p:sp>
       <p:sp>
         <p:nvSpPr>
-          <p:cNvPr id="394" name="Shape 394"/>
+          <p:cNvPr id="396" name="Shape 396"/>
           <p:cNvSpPr txBox="1"/>
           <p:nvPr>
             <p:ph idx="4294967295" type="body"/>
@@ -51440,7 +51594,7 @@
       </p:sp>
       <p:sp>
         <p:nvSpPr>
-          <p:cNvPr id="395" name="Shape 395"/>
+          <p:cNvPr id="397" name="Shape 397"/>
           <p:cNvSpPr/>
           <p:nvPr/>
         </p:nvSpPr>

</xml_diff>